<commit_message>
just some stuff to track
</commit_message>
<xml_diff>
--- a/pathfinder-presentation.pptx
+++ b/pathfinder-presentation.pptx
@@ -111,6 +111,11 @@
       </a:defRPr>
     </a:lvl9pPr>
   </p:defaultTextStyle>
+  <p:extLst>
+    <p:ext uri="{EFAFB233-063F-42B5-8137-9DF3F51BA10A}">
+      <p15:sldGuideLst xmlns:p15="http://schemas.microsoft.com/office/powerpoint/2012/main"/>
+    </p:ext>
+  </p:extLst>
 </p:presentation>
 </file>
 
@@ -161,6 +166,11 @@
               </a:ln>
               <a:effectLst/>
             </c:spPr>
+            <c:extLst>
+              <c:ext xmlns:c16="http://schemas.microsoft.com/office/drawing/2014/chart" uri="{C3380CC4-5D6E-409C-BE32-E72D297353CC}">
+                <c16:uniqueId val="{00000001-61B7-AC48-90F9-6A07A555D1AF}"/>
+              </c:ext>
+            </c:extLst>
           </c:dPt>
           <c:dPt>
             <c:idx val="1"/>
@@ -176,6 +186,11 @@
               </a:ln>
               <a:effectLst/>
             </c:spPr>
+            <c:extLst>
+              <c:ext xmlns:c16="http://schemas.microsoft.com/office/drawing/2014/chart" uri="{C3380CC4-5D6E-409C-BE32-E72D297353CC}">
+                <c16:uniqueId val="{00000003-61B7-AC48-90F9-6A07A555D1AF}"/>
+              </c:ext>
+            </c:extLst>
           </c:dPt>
           <c:dPt>
             <c:idx val="2"/>
@@ -191,6 +206,11 @@
               </a:ln>
               <a:effectLst/>
             </c:spPr>
+            <c:extLst>
+              <c:ext xmlns:c16="http://schemas.microsoft.com/office/drawing/2014/chart" uri="{C3380CC4-5D6E-409C-BE32-E72D297353CC}">
+                <c16:uniqueId val="{00000005-61B7-AC48-90F9-6A07A555D1AF}"/>
+              </c:ext>
+            </c:extLst>
           </c:dPt>
           <c:dPt>
             <c:idx val="3"/>
@@ -206,6 +226,11 @@
               </a:ln>
               <a:effectLst/>
             </c:spPr>
+            <c:extLst>
+              <c:ext xmlns:c16="http://schemas.microsoft.com/office/drawing/2014/chart" uri="{C3380CC4-5D6E-409C-BE32-E72D297353CC}">
+                <c16:uniqueId val="{00000007-61B7-AC48-90F9-6A07A555D1AF}"/>
+              </c:ext>
+            </c:extLst>
           </c:dPt>
           <c:cat>
             <c:strRef>
@@ -948,7 +973,7 @@
           <a:p>
             <a:fld id="{0E9C8A49-66F8-1140-9AD3-58437BED5DE2}" type="datetimeFigureOut">
               <a:rPr lang="en-US" smtClean="0"/>
-              <a:t>5/1/24</a:t>
+              <a:t>5/2/24</a:t>
             </a:fld>
             <a:endParaRPr lang="en-US"/>
           </a:p>
@@ -1446,7 +1471,7 @@
           <a:p>
             <a:fld id="{D5C62299-BC8F-2146-9D93-226C680D28F3}" type="datetimeFigureOut">
               <a:rPr lang="en-US" smtClean="0"/>
-              <a:t>5/1/24</a:t>
+              <a:t>5/2/24</a:t>
             </a:fld>
             <a:endParaRPr lang="en-US"/>
           </a:p>
@@ -1644,7 +1669,7 @@
           <a:p>
             <a:fld id="{D5C62299-BC8F-2146-9D93-226C680D28F3}" type="datetimeFigureOut">
               <a:rPr lang="en-US" smtClean="0"/>
-              <a:t>5/1/24</a:t>
+              <a:t>5/2/24</a:t>
             </a:fld>
             <a:endParaRPr lang="en-US"/>
           </a:p>
@@ -1852,7 +1877,7 @@
           <a:p>
             <a:fld id="{D5C62299-BC8F-2146-9D93-226C680D28F3}" type="datetimeFigureOut">
               <a:rPr lang="en-US" smtClean="0"/>
-              <a:t>5/1/24</a:t>
+              <a:t>5/2/24</a:t>
             </a:fld>
             <a:endParaRPr lang="en-US"/>
           </a:p>
@@ -2050,7 +2075,7 @@
           <a:p>
             <a:fld id="{D5C62299-BC8F-2146-9D93-226C680D28F3}" type="datetimeFigureOut">
               <a:rPr lang="en-US" smtClean="0"/>
-              <a:t>5/1/24</a:t>
+              <a:t>5/2/24</a:t>
             </a:fld>
             <a:endParaRPr lang="en-US"/>
           </a:p>
@@ -2325,7 +2350,7 @@
           <a:p>
             <a:fld id="{D5C62299-BC8F-2146-9D93-226C680D28F3}" type="datetimeFigureOut">
               <a:rPr lang="en-US" smtClean="0"/>
-              <a:t>5/1/24</a:t>
+              <a:t>5/2/24</a:t>
             </a:fld>
             <a:endParaRPr lang="en-US"/>
           </a:p>
@@ -2590,7 +2615,7 @@
           <a:p>
             <a:fld id="{D5C62299-BC8F-2146-9D93-226C680D28F3}" type="datetimeFigureOut">
               <a:rPr lang="en-US" smtClean="0"/>
-              <a:t>5/1/24</a:t>
+              <a:t>5/2/24</a:t>
             </a:fld>
             <a:endParaRPr lang="en-US"/>
           </a:p>
@@ -3002,7 +3027,7 @@
           <a:p>
             <a:fld id="{D5C62299-BC8F-2146-9D93-226C680D28F3}" type="datetimeFigureOut">
               <a:rPr lang="en-US" smtClean="0"/>
-              <a:t>5/1/24</a:t>
+              <a:t>5/2/24</a:t>
             </a:fld>
             <a:endParaRPr lang="en-US"/>
           </a:p>
@@ -3143,7 +3168,7 @@
           <a:p>
             <a:fld id="{D5C62299-BC8F-2146-9D93-226C680D28F3}" type="datetimeFigureOut">
               <a:rPr lang="en-US" smtClean="0"/>
-              <a:t>5/1/24</a:t>
+              <a:t>5/2/24</a:t>
             </a:fld>
             <a:endParaRPr lang="en-US"/>
           </a:p>
@@ -3256,7 +3281,7 @@
           <a:p>
             <a:fld id="{D5C62299-BC8F-2146-9D93-226C680D28F3}" type="datetimeFigureOut">
               <a:rPr lang="en-US" smtClean="0"/>
-              <a:t>5/1/24</a:t>
+              <a:t>5/2/24</a:t>
             </a:fld>
             <a:endParaRPr lang="en-US"/>
           </a:p>
@@ -3567,7 +3592,7 @@
           <a:p>
             <a:fld id="{D5C62299-BC8F-2146-9D93-226C680D28F3}" type="datetimeFigureOut">
               <a:rPr lang="en-US" smtClean="0"/>
-              <a:t>5/1/24</a:t>
+              <a:t>5/2/24</a:t>
             </a:fld>
             <a:endParaRPr lang="en-US"/>
           </a:p>
@@ -3855,7 +3880,7 @@
           <a:p>
             <a:fld id="{D5C62299-BC8F-2146-9D93-226C680D28F3}" type="datetimeFigureOut">
               <a:rPr lang="en-US" smtClean="0"/>
-              <a:t>5/1/24</a:t>
+              <a:t>5/2/24</a:t>
             </a:fld>
             <a:endParaRPr lang="en-US"/>
           </a:p>
@@ -4096,7 +4121,7 @@
           <a:p>
             <a:fld id="{D5C62299-BC8F-2146-9D93-226C680D28F3}" type="datetimeFigureOut">
               <a:rPr lang="en-US" smtClean="0"/>
-              <a:t>5/1/24</a:t>
+              <a:t>5/2/24</a:t>
             </a:fld>
             <a:endParaRPr lang="en-US"/>
           </a:p>
@@ -4754,7 +4779,7 @@
                 </a:solidFill>
                 <a:effectLst/>
                 <a:highlight>
-                  <a:srgbClr val="212121"/>
+                  <a:srgbClr val="000000"/>
                 </a:highlight>
                 <a:latin typeface="Courier New" panose="02070309020205020404" pitchFamily="49" charset="0"/>
                 <a:cs typeface="Courier New" panose="02070309020205020404" pitchFamily="49" charset="0"/>
@@ -4768,7 +4793,7 @@
                 </a:solidFill>
                 <a:effectLst/>
                 <a:highlight>
-                  <a:srgbClr val="212121"/>
+                  <a:srgbClr val="000000"/>
                 </a:highlight>
                 <a:latin typeface="Courier New" panose="02070309020205020404" pitchFamily="49" charset="0"/>
                 <a:cs typeface="Courier New" panose="02070309020205020404" pitchFamily="49" charset="0"/>
@@ -4782,7 +4807,7 @@
                 </a:solidFill>
                 <a:effectLst/>
                 <a:highlight>
-                  <a:srgbClr val="212121"/>
+                  <a:srgbClr val="000000"/>
                 </a:highlight>
                 <a:latin typeface="Courier New" panose="02070309020205020404" pitchFamily="49" charset="0"/>
                 <a:cs typeface="Courier New" panose="02070309020205020404" pitchFamily="49" charset="0"/>
@@ -4798,7 +4823,7 @@
                 </a:solidFill>
                 <a:effectLst/>
                 <a:highlight>
-                  <a:srgbClr val="212121"/>
+                  <a:srgbClr val="000000"/>
                 </a:highlight>
                 <a:latin typeface="Courier New" panose="02070309020205020404" pitchFamily="49" charset="0"/>
                 <a:cs typeface="Courier New" panose="02070309020205020404" pitchFamily="49" charset="0"/>
@@ -4812,7 +4837,7 @@
                 </a:solidFill>
                 <a:effectLst/>
                 <a:highlight>
-                  <a:srgbClr val="212121"/>
+                  <a:srgbClr val="000000"/>
                 </a:highlight>
                 <a:latin typeface="Courier New" panose="02070309020205020404" pitchFamily="49" charset="0"/>
                 <a:cs typeface="Courier New" panose="02070309020205020404" pitchFamily="49" charset="0"/>
@@ -4825,7 +4850,7 @@
                   <a:schemeClr val="bg1"/>
                 </a:solidFill>
                 <a:highlight>
-                  <a:srgbClr val="212121"/>
+                  <a:srgbClr val="000000"/>
                 </a:highlight>
                 <a:latin typeface="Courier New" panose="02070309020205020404" pitchFamily="49" charset="0"/>
                 <a:cs typeface="Courier New" panose="02070309020205020404" pitchFamily="49" charset="0"/>
@@ -4839,7 +4864,7 @@
                 </a:solidFill>
                 <a:effectLst/>
                 <a:highlight>
-                  <a:srgbClr val="212121"/>
+                  <a:srgbClr val="000000"/>
                 </a:highlight>
                 <a:latin typeface="Courier New" panose="02070309020205020404" pitchFamily="49" charset="0"/>
                 <a:cs typeface="Courier New" panose="02070309020205020404" pitchFamily="49" charset="0"/>
@@ -4850,6 +4875,9 @@
               <a:solidFill>
                 <a:srgbClr val="FF0000"/>
               </a:solidFill>
+              <a:highlight>
+                <a:srgbClr val="000000"/>
+              </a:highlight>
               <a:latin typeface="Courier New" panose="02070309020205020404" pitchFamily="49" charset="0"/>
               <a:cs typeface="Courier New" panose="02070309020205020404" pitchFamily="49" charset="0"/>
             </a:endParaRPr>
@@ -4988,7 +5016,7 @@
                 </a:solidFill>
                 <a:effectLst/>
                 <a:highlight>
-                  <a:srgbClr val="212121"/>
+                  <a:srgbClr val="000000"/>
                 </a:highlight>
                 <a:latin typeface="Courier New" panose="02070309020205020404" pitchFamily="49" charset="0"/>
                 <a:cs typeface="Courier New" panose="02070309020205020404" pitchFamily="49" charset="0"/>
@@ -5002,7 +5030,7 @@
                 </a:solidFill>
                 <a:effectLst/>
                 <a:highlight>
-                  <a:srgbClr val="212121"/>
+                  <a:srgbClr val="000000"/>
                 </a:highlight>
                 <a:latin typeface="Courier New" panose="02070309020205020404" pitchFamily="49" charset="0"/>
                 <a:cs typeface="Courier New" panose="02070309020205020404" pitchFamily="49" charset="0"/>
@@ -5016,26 +5044,26 @@
                 </a:solidFill>
                 <a:effectLst/>
                 <a:highlight>
-                  <a:srgbClr val="212121"/>
+                  <a:srgbClr val="000000"/>
                 </a:highlight>
                 <a:latin typeface="Courier New" panose="02070309020205020404" pitchFamily="49" charset="0"/>
                 <a:cs typeface="Courier New" panose="02070309020205020404" pitchFamily="49" charset="0"/>
               </a:rPr>
-              <a:t>take in all your related documentation on a particular subject and organizes that data in a way that humans can best interact or query that data.  </a:t>
-            </a:r>
-            <a:r>
-              <a:rPr lang="en-US" b="0" i="0" dirty="0">
+              <a:t>takes in all your related documentation on a particular subject and organizes that data in a way that humans can best interact or query that data.  </a:t>
+            </a:r>
+            <a:r>
+              <a:rPr lang="en-US" b="0" i="0" dirty="0" err="1">
                 <a:solidFill>
                   <a:srgbClr val="FF0000"/>
                 </a:solidFill>
                 <a:effectLst/>
                 <a:highlight>
-                  <a:srgbClr val="212121"/>
+                  <a:srgbClr val="000000"/>
                 </a:highlight>
                 <a:latin typeface="Courier New" panose="02070309020205020404" pitchFamily="49" charset="0"/>
                 <a:cs typeface="Courier New" panose="02070309020205020404" pitchFamily="49" charset="0"/>
               </a:rPr>
-              <a:t>Pathfinder</a:t>
+              <a:t>PathFinder</a:t>
             </a:r>
             <a:r>
               <a:rPr lang="en-US" b="0" i="0" dirty="0">
@@ -5044,7 +5072,7 @@
                 </a:solidFill>
                 <a:effectLst/>
                 <a:highlight>
-                  <a:srgbClr val="212121"/>
+                  <a:srgbClr val="000000"/>
                 </a:highlight>
                 <a:latin typeface="Courier New" panose="02070309020205020404" pitchFamily="49" charset="0"/>
                 <a:cs typeface="Courier New" panose="02070309020205020404" pitchFamily="49" charset="0"/>
@@ -5055,6 +5083,9 @@
               <a:solidFill>
                 <a:srgbClr val="FF0000"/>
               </a:solidFill>
+              <a:highlight>
+                <a:srgbClr val="000000"/>
+              </a:highlight>
               <a:latin typeface="Courier New" panose="02070309020205020404" pitchFamily="49" charset="0"/>
               <a:cs typeface="Courier New" panose="02070309020205020404" pitchFamily="49" charset="0"/>
             </a:endParaRPr>
@@ -5193,7 +5224,7 @@
                 </a:solidFill>
                 <a:effectLst/>
                 <a:highlight>
-                  <a:srgbClr val="212121"/>
+                  <a:srgbClr val="000000"/>
                 </a:highlight>
                 <a:latin typeface="Courier New" panose="02070309020205020404" pitchFamily="49" charset="0"/>
                 <a:cs typeface="Courier New" panose="02070309020205020404" pitchFamily="49" charset="0"/>
@@ -5206,7 +5237,7 @@
                   <a:srgbClr val="FF0000"/>
                 </a:solidFill>
                 <a:highlight>
-                  <a:srgbClr val="212121"/>
+                  <a:srgbClr val="000000"/>
                 </a:highlight>
                 <a:latin typeface="Courier New" panose="02070309020205020404" pitchFamily="49" charset="0"/>
                 <a:cs typeface="Courier New" panose="02070309020205020404" pitchFamily="49" charset="0"/>
@@ -5219,7 +5250,7 @@
                   <a:schemeClr val="bg1"/>
                 </a:solidFill>
                 <a:highlight>
-                  <a:srgbClr val="212121"/>
+                  <a:srgbClr val="000000"/>
                 </a:highlight>
                 <a:latin typeface="Courier New" panose="02070309020205020404" pitchFamily="49" charset="0"/>
                 <a:cs typeface="Courier New" panose="02070309020205020404" pitchFamily="49" charset="0"/>
@@ -5232,7 +5263,7 @@
                   <a:srgbClr val="FF0000"/>
                 </a:solidFill>
                 <a:highlight>
-                  <a:srgbClr val="212121"/>
+                  <a:srgbClr val="000000"/>
                 </a:highlight>
                 <a:latin typeface="Courier New" panose="02070309020205020404" pitchFamily="49" charset="0"/>
                 <a:cs typeface="Courier New" panose="02070309020205020404" pitchFamily="49" charset="0"/>
@@ -5245,7 +5276,7 @@
                   <a:schemeClr val="bg1"/>
                 </a:solidFill>
                 <a:highlight>
-                  <a:srgbClr val="212121"/>
+                  <a:srgbClr val="000000"/>
                 </a:highlight>
                 <a:latin typeface="Courier New" panose="02070309020205020404" pitchFamily="49" charset="0"/>
                 <a:cs typeface="Courier New" panose="02070309020205020404" pitchFamily="49" charset="0"/>
@@ -5256,6 +5287,9 @@
               <a:solidFill>
                 <a:srgbClr val="FF0000"/>
               </a:solidFill>
+              <a:highlight>
+                <a:srgbClr val="000000"/>
+              </a:highlight>
               <a:latin typeface="Courier New" panose="02070309020205020404" pitchFamily="49" charset="0"/>
               <a:cs typeface="Courier New" panose="02070309020205020404" pitchFamily="49" charset="0"/>
             </a:endParaRPr>
@@ -6013,14 +6047,14 @@
           <p:nvPr>
             <p:extLst>
               <p:ext uri="{D42A27DB-BD31-4B8C-83A1-F6EECF244321}">
-                <p14:modId xmlns:p14="http://schemas.microsoft.com/office/powerpoint/2010/main" val="2880734155"/>
+                <p14:modId xmlns:p14="http://schemas.microsoft.com/office/powerpoint/2010/main" val="3043509439"/>
               </p:ext>
             </p:extLst>
           </p:nvPr>
         </p:nvGraphicFramePr>
         <p:xfrm>
           <a:off x="838201" y="2189771"/>
-          <a:ext cx="2612366" cy="3870960"/>
+          <a:ext cx="2688566" cy="3870960"/>
         </p:xfrm>
         <a:graphic>
           <a:graphicData uri="http://schemas.openxmlformats.org/drawingml/2006/table">
@@ -6029,7 +6063,7 @@
                 <a:tableStyleId>{93296810-A885-4BE3-A3E7-6D5BEEA58F35}</a:tableStyleId>
               </a:tblPr>
               <a:tblGrid>
-                <a:gridCol w="2612366">
+                <a:gridCol w="2688566">
                   <a:extLst>
                     <a:ext uri="{9D8B030D-6E8A-4147-A177-3AD203B41FA5}">
                       <a16:colId xmlns:a16="http://schemas.microsoft.com/office/drawing/2014/main" val="4127536397"/>
@@ -6656,14 +6690,14 @@
           <p:nvPr>
             <p:extLst>
               <p:ext uri="{D42A27DB-BD31-4B8C-83A1-F6EECF244321}">
-                <p14:modId xmlns:p14="http://schemas.microsoft.com/office/powerpoint/2010/main" val="4109370558"/>
+                <p14:modId xmlns:p14="http://schemas.microsoft.com/office/powerpoint/2010/main" val="3225384209"/>
               </p:ext>
             </p:extLst>
           </p:nvPr>
         </p:nvGraphicFramePr>
         <p:xfrm>
-          <a:off x="8599715" y="2189771"/>
-          <a:ext cx="2612366" cy="3870960"/>
+          <a:off x="8599714" y="2189771"/>
+          <a:ext cx="2703763" cy="3870960"/>
         </p:xfrm>
         <a:graphic>
           <a:graphicData uri="http://schemas.openxmlformats.org/drawingml/2006/table">
@@ -6672,7 +6706,7 @@
                 <a:tableStyleId>{21E4AEA4-8DFA-4A89-87EB-49C32662AFE0}</a:tableStyleId>
               </a:tblPr>
               <a:tblGrid>
-                <a:gridCol w="2612366">
+                <a:gridCol w="2703763">
                   <a:extLst>
                     <a:ext uri="{9D8B030D-6E8A-4147-A177-3AD203B41FA5}">
                       <a16:colId xmlns:a16="http://schemas.microsoft.com/office/drawing/2014/main" val="4127536397"/>
@@ -7049,8 +7083,8 @@
           </a:prstGeom>
           <a:solidFill>
             <a:schemeClr val="accent6">
-              <a:lumMod val="40000"/>
-              <a:lumOff val="60000"/>
+              <a:lumMod val="20000"/>
+              <a:lumOff val="80000"/>
             </a:schemeClr>
           </a:solidFill>
         </p:spPr>

</xml_diff>